<commit_message>
Switch text and slides (slide first); add newer versions of pdf and pptx
</commit_message>
<xml_diff>
--- a/content/programmeren/php-basis-if/php-basis-if.pptx
+++ b/content/programmeren/php-basis-if/php-basis-if.pptx
@@ -5,7 +5,8 @@
     <p:sldMasterId id="2147483648" r:id="rId1"/>
   </p:sldMasterIdLst>
   <p:sldIdLst>
-    <p:sldId id="256" r:id="rId2"/>
+    <p:sldId id="257" r:id="rId2"/>
+    <p:sldId id="256" r:id="rId3"/>
   </p:sldIdLst>
   <p:sldSz cx="12192000" cy="6858000"/>
   <p:notesSz cx="6858000" cy="9144000"/>
@@ -307,7 +308,7 @@
             <a:srgbClr val="A4A3A4"/>
           </p15:clr>
         </p15:guide>
-        <p15:guide id="41" pos="6788" userDrawn="1">
+        <p15:guide id="41" pos="6766" userDrawn="1">
           <p15:clr>
             <a:srgbClr val="A4A3A4"/>
           </p15:clr>
@@ -342,7 +343,7 @@
             <a:srgbClr val="A4A3A4"/>
           </p15:clr>
         </p15:guide>
-        <p15:guide id="48" orient="horz" pos="2387" userDrawn="1">
+        <p15:guide id="48" orient="horz" pos="2364" userDrawn="1">
           <p15:clr>
             <a:srgbClr val="A4A3A4"/>
           </p15:clr>
@@ -519,7 +520,7 @@
           <a:lstStyle/>
           <a:p>
             <a:fld id="{58F0AE5A-190D-344F-BA1E-7FF8AC8FA5BE}" type="datetimeFigureOut">
-              <a:t>09-11-2020</a:t>
+              <a:t>10-11-2020</a:t>
             </a:fld>
             <a:endParaRPr lang="nl-NL"/>
           </a:p>
@@ -715,7 +716,7 @@
           <a:lstStyle/>
           <a:p>
             <a:fld id="{58F0AE5A-190D-344F-BA1E-7FF8AC8FA5BE}" type="datetimeFigureOut">
-              <a:t>09-11-2020</a:t>
+              <a:t>10-11-2020</a:t>
             </a:fld>
             <a:endParaRPr lang="nl-NL"/>
           </a:p>
@@ -921,7 +922,7 @@
           <a:lstStyle/>
           <a:p>
             <a:fld id="{58F0AE5A-190D-344F-BA1E-7FF8AC8FA5BE}" type="datetimeFigureOut">
-              <a:t>09-11-2020</a:t>
+              <a:t>10-11-2020</a:t>
             </a:fld>
             <a:endParaRPr lang="nl-NL"/>
           </a:p>
@@ -1117,7 +1118,7 @@
           <a:lstStyle/>
           <a:p>
             <a:fld id="{58F0AE5A-190D-344F-BA1E-7FF8AC8FA5BE}" type="datetimeFigureOut">
-              <a:t>09-11-2020</a:t>
+              <a:t>10-11-2020</a:t>
             </a:fld>
             <a:endParaRPr lang="nl-NL"/>
           </a:p>
@@ -1390,7 +1391,7 @@
           <a:lstStyle/>
           <a:p>
             <a:fld id="{58F0AE5A-190D-344F-BA1E-7FF8AC8FA5BE}" type="datetimeFigureOut">
-              <a:t>09-11-2020</a:t>
+              <a:t>10-11-2020</a:t>
             </a:fld>
             <a:endParaRPr lang="nl-NL"/>
           </a:p>
@@ -1653,7 +1654,7 @@
           <a:lstStyle/>
           <a:p>
             <a:fld id="{58F0AE5A-190D-344F-BA1E-7FF8AC8FA5BE}" type="datetimeFigureOut">
-              <a:t>09-11-2020</a:t>
+              <a:t>10-11-2020</a:t>
             </a:fld>
             <a:endParaRPr lang="nl-NL"/>
           </a:p>
@@ -2063,7 +2064,7 @@
           <a:lstStyle/>
           <a:p>
             <a:fld id="{58F0AE5A-190D-344F-BA1E-7FF8AC8FA5BE}" type="datetimeFigureOut">
-              <a:t>09-11-2020</a:t>
+              <a:t>10-11-2020</a:t>
             </a:fld>
             <a:endParaRPr lang="nl-NL"/>
           </a:p>
@@ -2202,7 +2203,7 @@
           <a:lstStyle/>
           <a:p>
             <a:fld id="{58F0AE5A-190D-344F-BA1E-7FF8AC8FA5BE}" type="datetimeFigureOut">
-              <a:t>09-11-2020</a:t>
+              <a:t>10-11-2020</a:t>
             </a:fld>
             <a:endParaRPr lang="nl-NL"/>
           </a:p>
@@ -2313,7 +2314,7 @@
           <a:lstStyle/>
           <a:p>
             <a:fld id="{58F0AE5A-190D-344F-BA1E-7FF8AC8FA5BE}" type="datetimeFigureOut">
-              <a:t>09-11-2020</a:t>
+              <a:t>10-11-2020</a:t>
             </a:fld>
             <a:endParaRPr lang="nl-NL"/>
           </a:p>
@@ -2622,7 +2623,7 @@
           <a:lstStyle/>
           <a:p>
             <a:fld id="{58F0AE5A-190D-344F-BA1E-7FF8AC8FA5BE}" type="datetimeFigureOut">
-              <a:t>09-11-2020</a:t>
+              <a:t>10-11-2020</a:t>
             </a:fld>
             <a:endParaRPr lang="nl-NL"/>
           </a:p>
@@ -2911,7 +2912,7 @@
           <a:lstStyle/>
           <a:p>
             <a:fld id="{58F0AE5A-190D-344F-BA1E-7FF8AC8FA5BE}" type="datetimeFigureOut">
-              <a:t>09-11-2020</a:t>
+              <a:t>10-11-2020</a:t>
             </a:fld>
             <a:endParaRPr lang="nl-NL"/>
           </a:p>
@@ -3150,7 +3151,7 @@
           </a:lstStyle>
           <a:p>
             <a:fld id="{58F0AE5A-190D-344F-BA1E-7FF8AC8FA5BE}" type="datetimeFigureOut">
-              <a:t>09-11-2020</a:t>
+              <a:t>10-11-2020</a:t>
             </a:fld>
             <a:endParaRPr lang="nl-NL"/>
           </a:p>
@@ -3550,6 +3551,447 @@
 </file>
 
 <file path=ppt/slides/slide1.xml><?xml version="1.0" encoding="utf-8"?>
+<p:sld xmlns:a="http://schemas.openxmlformats.org/drawingml/2006/main" xmlns:r="http://schemas.openxmlformats.org/officeDocument/2006/relationships" xmlns:p="http://schemas.openxmlformats.org/presentationml/2006/main">
+  <p:cSld>
+    <p:spTree>
+      <p:nvGrpSpPr>
+        <p:cNvPr id="1" name=""/>
+        <p:cNvGrpSpPr/>
+        <p:nvPr/>
+      </p:nvGrpSpPr>
+      <p:grpSpPr>
+        <a:xfrm>
+          <a:off x="0" y="0"/>
+          <a:ext cx="0" cy="0"/>
+          <a:chOff x="0" y="0"/>
+          <a:chExt cx="0" cy="0"/>
+        </a:xfrm>
+      </p:grpSpPr>
+      <p:sp>
+        <p:nvSpPr>
+          <p:cNvPr id="50" name="Boog 49">
+            <a:extLst>
+              <a:ext uri="{FF2B5EF4-FFF2-40B4-BE49-F238E27FC236}">
+                <a16:creationId xmlns:a16="http://schemas.microsoft.com/office/drawing/2014/main" id="{DB10F566-065C-174B-B170-B976C49FAF68}"/>
+              </a:ext>
+            </a:extLst>
+          </p:cNvPr>
+          <p:cNvSpPr/>
+          <p:nvPr/>
+        </p:nvSpPr>
+        <p:spPr>
+          <a:xfrm flipH="1">
+            <a:off x="6497752" y="1600193"/>
+            <a:ext cx="7208307" cy="9422868"/>
+          </a:xfrm>
+          <a:prstGeom prst="arc">
+            <a:avLst>
+              <a:gd name="adj1" fmla="val 16369105"/>
+              <a:gd name="adj2" fmla="val 112818"/>
+            </a:avLst>
+          </a:prstGeom>
+          <a:ln w="812800">
+            <a:solidFill>
+              <a:schemeClr val="tx1"/>
+            </a:solidFill>
+            <a:tailEnd type="none"/>
+          </a:ln>
+        </p:spPr>
+        <p:style>
+          <a:lnRef idx="1">
+            <a:schemeClr val="accent1"/>
+          </a:lnRef>
+          <a:fillRef idx="0">
+            <a:schemeClr val="accent1"/>
+          </a:fillRef>
+          <a:effectRef idx="0">
+            <a:schemeClr val="accent1"/>
+          </a:effectRef>
+          <a:fontRef idx="minor">
+            <a:schemeClr val="tx1"/>
+          </a:fontRef>
+        </p:style>
+        <p:txBody>
+          <a:bodyPr rtlCol="0" anchor="ctr"/>
+          <a:lstStyle/>
+          <a:p>
+            <a:pPr algn="ctr"/>
+            <a:endParaRPr lang="nl-NL"/>
+          </a:p>
+        </p:txBody>
+      </p:sp>
+      <p:sp>
+        <p:nvSpPr>
+          <p:cNvPr id="49" name="Boog 48">
+            <a:extLst>
+              <a:ext uri="{FF2B5EF4-FFF2-40B4-BE49-F238E27FC236}">
+                <a16:creationId xmlns:a16="http://schemas.microsoft.com/office/drawing/2014/main" id="{C7A9AF7C-24E6-E240-91C9-A8275BE23E6B}"/>
+              </a:ext>
+            </a:extLst>
+          </p:cNvPr>
+          <p:cNvSpPr/>
+          <p:nvPr/>
+        </p:nvSpPr>
+        <p:spPr>
+          <a:xfrm>
+            <a:off x="1509756" y="2322927"/>
+            <a:ext cx="4169121" cy="8155123"/>
+          </a:xfrm>
+          <a:prstGeom prst="arc">
+            <a:avLst>
+              <a:gd name="adj1" fmla="val 16181904"/>
+              <a:gd name="adj2" fmla="val 60055"/>
+            </a:avLst>
+          </a:prstGeom>
+          <a:ln w="812800">
+            <a:solidFill>
+              <a:schemeClr val="tx1"/>
+            </a:solidFill>
+            <a:tailEnd type="none"/>
+          </a:ln>
+        </p:spPr>
+        <p:style>
+          <a:lnRef idx="1">
+            <a:schemeClr val="accent1"/>
+          </a:lnRef>
+          <a:fillRef idx="0">
+            <a:schemeClr val="accent1"/>
+          </a:fillRef>
+          <a:effectRef idx="0">
+            <a:schemeClr val="accent1"/>
+          </a:effectRef>
+          <a:fontRef idx="minor">
+            <a:schemeClr val="tx1"/>
+          </a:fontRef>
+        </p:style>
+        <p:txBody>
+          <a:bodyPr rtlCol="0" anchor="ctr"/>
+          <a:lstStyle/>
+          <a:p>
+            <a:pPr algn="ctr"/>
+            <a:endParaRPr lang="nl-NL"/>
+          </a:p>
+        </p:txBody>
+      </p:sp>
+      <p:grpSp>
+        <p:nvGrpSpPr>
+          <p:cNvPr id="17" name="Groep 16">
+            <a:extLst>
+              <a:ext uri="{FF2B5EF4-FFF2-40B4-BE49-F238E27FC236}">
+                <a16:creationId xmlns:a16="http://schemas.microsoft.com/office/drawing/2014/main" id="{3B415221-C80D-FE47-90B8-66DCBC2AEEF2}"/>
+              </a:ext>
+            </a:extLst>
+          </p:cNvPr>
+          <p:cNvGrpSpPr/>
+          <p:nvPr/>
+        </p:nvGrpSpPr>
+        <p:grpSpPr>
+          <a:xfrm>
+            <a:off x="3307015" y="-236882"/>
+            <a:ext cx="5582478" cy="5418068"/>
+            <a:chOff x="3304761" y="549275"/>
+            <a:chExt cx="5582478" cy="5670964"/>
+          </a:xfrm>
+        </p:grpSpPr>
+        <p:pic>
+          <p:nvPicPr>
+            <p:cNvPr id="16" name="Graphic 15" descr="Wegwijzer">
+              <a:extLst>
+                <a:ext uri="{FF2B5EF4-FFF2-40B4-BE49-F238E27FC236}">
+                  <a16:creationId xmlns:a16="http://schemas.microsoft.com/office/drawing/2014/main" id="{E636C51E-4410-BB4F-B731-F9A27934DF65}"/>
+                </a:ext>
+              </a:extLst>
+            </p:cNvPr>
+            <p:cNvPicPr>
+              <a:picLocks noChangeAspect="1"/>
+            </p:cNvPicPr>
+            <p:nvPr/>
+          </p:nvPicPr>
+          <p:blipFill>
+            <a:blip r:embed="rId2">
+              <a:extLst>
+                <a:ext uri="{96DAC541-7B7A-43D3-8B79-37D633B846F1}">
+                  <asvg:svgBlip xmlns:asvg="http://schemas.microsoft.com/office/drawing/2016/SVG/main" r:embed="rId3"/>
+                </a:ext>
+              </a:extLst>
+            </a:blip>
+            <a:stretch>
+              <a:fillRect/>
+            </a:stretch>
+          </p:blipFill>
+          <p:spPr>
+            <a:xfrm>
+              <a:off x="3304761" y="549275"/>
+              <a:ext cx="5582478" cy="5670964"/>
+            </a:xfrm>
+            <a:prstGeom prst="rect">
+              <a:avLst/>
+            </a:prstGeom>
+          </p:spPr>
+        </p:pic>
+        <p:sp>
+          <p:nvSpPr>
+            <p:cNvPr id="5" name="Tekstvak 4">
+              <a:extLst>
+                <a:ext uri="{FF2B5EF4-FFF2-40B4-BE49-F238E27FC236}">
+                  <a16:creationId xmlns:a16="http://schemas.microsoft.com/office/drawing/2014/main" id="{5D29983F-E3E2-BA4B-A829-4E1AA56ACE80}"/>
+                </a:ext>
+              </a:extLst>
+            </p:cNvPr>
+            <p:cNvSpPr txBox="1"/>
+            <p:nvPr/>
+          </p:nvSpPr>
+          <p:spPr>
+            <a:xfrm>
+              <a:off x="4347082" y="2004232"/>
+              <a:ext cx="1459054" cy="584775"/>
+            </a:xfrm>
+            <a:prstGeom prst="rect">
+              <a:avLst/>
+            </a:prstGeom>
+            <a:noFill/>
+          </p:spPr>
+          <p:txBody>
+            <a:bodyPr wrap="none" rtlCol="0">
+              <a:spAutoFit/>
+            </a:bodyPr>
+            <a:lstStyle/>
+            <a:p>
+              <a:r>
+                <a:rPr lang="nl-NL" sz="3200" b="1"/>
+                <a:t>London</a:t>
+              </a:r>
+            </a:p>
+          </p:txBody>
+        </p:sp>
+        <p:sp>
+          <p:nvSpPr>
+            <p:cNvPr id="6" name="Tekstvak 5">
+              <a:extLst>
+                <a:ext uri="{FF2B5EF4-FFF2-40B4-BE49-F238E27FC236}">
+                  <a16:creationId xmlns:a16="http://schemas.microsoft.com/office/drawing/2014/main" id="{FBF29EEF-0FAD-F445-A9B4-BF1435378C66}"/>
+                </a:ext>
+              </a:extLst>
+            </p:cNvPr>
+            <p:cNvSpPr txBox="1"/>
+            <p:nvPr/>
+          </p:nvSpPr>
+          <p:spPr>
+            <a:xfrm>
+              <a:off x="6756385" y="3417463"/>
+              <a:ext cx="1007007" cy="584775"/>
+            </a:xfrm>
+            <a:prstGeom prst="rect">
+              <a:avLst/>
+            </a:prstGeom>
+            <a:noFill/>
+          </p:spPr>
+          <p:txBody>
+            <a:bodyPr wrap="none" rtlCol="0">
+              <a:spAutoFit/>
+            </a:bodyPr>
+            <a:lstStyle/>
+            <a:p>
+              <a:r>
+                <a:rPr lang="nl-NL" sz="3200" b="1"/>
+                <a:t>Paris</a:t>
+              </a:r>
+            </a:p>
+          </p:txBody>
+        </p:sp>
+      </p:grpSp>
+      <p:pic>
+        <p:nvPicPr>
+          <p:cNvPr id="52" name="Graphic 51" descr="Taxi">
+            <a:extLst>
+              <a:ext uri="{FF2B5EF4-FFF2-40B4-BE49-F238E27FC236}">
+                <a16:creationId xmlns:a16="http://schemas.microsoft.com/office/drawing/2014/main" id="{53595E61-57E1-A04F-AE2D-B405FD32D335}"/>
+              </a:ext>
+            </a:extLst>
+          </p:cNvPr>
+          <p:cNvPicPr>
+            <a:picLocks noChangeAspect="1"/>
+          </p:cNvPicPr>
+          <p:nvPr/>
+        </p:nvPicPr>
+        <p:blipFill>
+          <a:blip r:embed="rId4">
+            <a:extLst>
+              <a:ext uri="{96DAC541-7B7A-43D3-8B79-37D633B846F1}">
+                <asvg:svgBlip xmlns:asvg="http://schemas.microsoft.com/office/drawing/2016/SVG/main" r:embed="rId5"/>
+              </a:ext>
+            </a:extLst>
+          </a:blip>
+          <a:stretch>
+            <a:fillRect/>
+          </a:stretch>
+        </p:blipFill>
+        <p:spPr>
+          <a:xfrm>
+            <a:off x="4386083" y="2621377"/>
+            <a:ext cx="914400" cy="914400"/>
+          </a:xfrm>
+          <a:prstGeom prst="rect">
+            <a:avLst/>
+          </a:prstGeom>
+        </p:spPr>
+      </p:pic>
+      <p:pic>
+        <p:nvPicPr>
+          <p:cNvPr id="53" name="Graphic 52" descr="Taxi">
+            <a:extLst>
+              <a:ext uri="{FF2B5EF4-FFF2-40B4-BE49-F238E27FC236}">
+                <a16:creationId xmlns:a16="http://schemas.microsoft.com/office/drawing/2014/main" id="{7747F179-D04E-BD4A-81ED-1CEAA2929AB9}"/>
+              </a:ext>
+            </a:extLst>
+          </p:cNvPr>
+          <p:cNvPicPr>
+            <a:picLocks noChangeAspect="1"/>
+          </p:cNvPicPr>
+          <p:nvPr/>
+        </p:nvPicPr>
+        <p:blipFill>
+          <a:blip r:embed="rId4">
+            <a:extLst>
+              <a:ext uri="{96DAC541-7B7A-43D3-8B79-37D633B846F1}">
+                <asvg:svgBlip xmlns:asvg="http://schemas.microsoft.com/office/drawing/2016/SVG/main" r:embed="rId5"/>
+              </a:ext>
+            </a:extLst>
+          </a:blip>
+          <a:stretch>
+            <a:fillRect/>
+          </a:stretch>
+        </p:blipFill>
+        <p:spPr>
+          <a:xfrm>
+            <a:off x="6055925" y="5492750"/>
+            <a:ext cx="914400" cy="914400"/>
+          </a:xfrm>
+          <a:prstGeom prst="rect">
+            <a:avLst/>
+          </a:prstGeom>
+        </p:spPr>
+      </p:pic>
+      <p:sp>
+        <p:nvSpPr>
+          <p:cNvPr id="54" name="Boog 53">
+            <a:extLst>
+              <a:ext uri="{FF2B5EF4-FFF2-40B4-BE49-F238E27FC236}">
+                <a16:creationId xmlns:a16="http://schemas.microsoft.com/office/drawing/2014/main" id="{8DE82382-1AF3-FA4D-962F-CD8CA43C59E2}"/>
+              </a:ext>
+            </a:extLst>
+          </p:cNvPr>
+          <p:cNvSpPr/>
+          <p:nvPr/>
+        </p:nvSpPr>
+        <p:spPr>
+          <a:xfrm flipH="1" flipV="1">
+            <a:off x="1566517" y="-804067"/>
+            <a:ext cx="4169121" cy="3126994"/>
+          </a:xfrm>
+          <a:prstGeom prst="arc">
+            <a:avLst>
+              <a:gd name="adj1" fmla="val 16181904"/>
+              <a:gd name="adj2" fmla="val 60055"/>
+            </a:avLst>
+          </a:prstGeom>
+          <a:ln w="812800">
+            <a:solidFill>
+              <a:schemeClr val="tx1"/>
+            </a:solidFill>
+            <a:tailEnd type="none"/>
+          </a:ln>
+        </p:spPr>
+        <p:style>
+          <a:lnRef idx="1">
+            <a:schemeClr val="accent1"/>
+          </a:lnRef>
+          <a:fillRef idx="0">
+            <a:schemeClr val="accent1"/>
+          </a:fillRef>
+          <a:effectRef idx="0">
+            <a:schemeClr val="accent1"/>
+          </a:effectRef>
+          <a:fontRef idx="minor">
+            <a:schemeClr val="tx1"/>
+          </a:fontRef>
+        </p:style>
+        <p:txBody>
+          <a:bodyPr rtlCol="0" anchor="ctr"/>
+          <a:lstStyle/>
+          <a:p>
+            <a:pPr algn="ctr"/>
+            <a:endParaRPr lang="nl-NL"/>
+          </a:p>
+        </p:txBody>
+      </p:sp>
+      <p:sp>
+        <p:nvSpPr>
+          <p:cNvPr id="56" name="Boog 55">
+            <a:extLst>
+              <a:ext uri="{FF2B5EF4-FFF2-40B4-BE49-F238E27FC236}">
+                <a16:creationId xmlns:a16="http://schemas.microsoft.com/office/drawing/2014/main" id="{5E129C49-6AC1-7A4B-B7AA-BE79AD6A8CCD}"/>
+              </a:ext>
+            </a:extLst>
+          </p:cNvPr>
+          <p:cNvSpPr/>
+          <p:nvPr/>
+        </p:nvSpPr>
+        <p:spPr>
+          <a:xfrm rot="383800" flipV="1">
+            <a:off x="7407335" y="-1198200"/>
+            <a:ext cx="3702027" cy="2853738"/>
+          </a:xfrm>
+          <a:prstGeom prst="arc">
+            <a:avLst>
+              <a:gd name="adj1" fmla="val 17744909"/>
+              <a:gd name="adj2" fmla="val 20392788"/>
+            </a:avLst>
+          </a:prstGeom>
+          <a:ln w="812800">
+            <a:solidFill>
+              <a:schemeClr val="tx1"/>
+            </a:solidFill>
+            <a:tailEnd type="none"/>
+          </a:ln>
+        </p:spPr>
+        <p:style>
+          <a:lnRef idx="1">
+            <a:schemeClr val="accent1"/>
+          </a:lnRef>
+          <a:fillRef idx="0">
+            <a:schemeClr val="accent1"/>
+          </a:fillRef>
+          <a:effectRef idx="0">
+            <a:schemeClr val="accent1"/>
+          </a:effectRef>
+          <a:fontRef idx="minor">
+            <a:schemeClr val="tx1"/>
+          </a:fontRef>
+        </p:style>
+        <p:txBody>
+          <a:bodyPr rtlCol="0" anchor="ctr"/>
+          <a:lstStyle/>
+          <a:p>
+            <a:pPr algn="ctr"/>
+            <a:endParaRPr lang="nl-NL"/>
+          </a:p>
+        </p:txBody>
+      </p:sp>
+    </p:spTree>
+    <p:extLst>
+      <p:ext uri="{BB962C8B-B14F-4D97-AF65-F5344CB8AC3E}">
+        <p14:creationId xmlns:p14="http://schemas.microsoft.com/office/powerpoint/2010/main" val="646926889"/>
+      </p:ext>
+    </p:extLst>
+  </p:cSld>
+  <p:clrMapOvr>
+    <a:masterClrMapping/>
+  </p:clrMapOvr>
+</p:sld>
+</file>
+
+<file path=ppt/slides/slide2.xml><?xml version="1.0" encoding="utf-8"?>
 <p:sld xmlns:a="http://schemas.openxmlformats.org/drawingml/2006/main" xmlns:r="http://schemas.openxmlformats.org/officeDocument/2006/relationships" xmlns:p="http://schemas.openxmlformats.org/presentationml/2006/main">
   <p:cSld>
     <p:spTree>

</xml_diff>